<commit_message>
final draft of report
</commit_message>
<xml_diff>
--- a/Reports/Final Project/Report/Block_Design.pptx
+++ b/Reports/Final Project/Report/Block_Design.pptx
@@ -106,7 +106,7 @@
   </p:defaultTextStyle>
   <p:extLst>
     <p:ext uri="{EFAFB233-063F-42B5-8137-9DF3F51BA10A}">
-      <p15:sldGuideLst xmlns:p15="http://schemas.microsoft.com/office/powerpoint/2012/main"/>
+      <p15:sldGuideLst xmlns:p15="http://schemas.microsoft.com/office/powerpoint/2012/main" xmlns=""/>
     </p:ext>
   </p:extLst>
 </p:presentation>
@@ -243,7 +243,7 @@
           <a:p>
             <a:fld id="{DCA522CA-1398-4DDF-81D3-E4C239679051}" type="datetimeFigureOut">
               <a:rPr lang="en-US" smtClean="0"/>
-              <a:t>4/16/2015</a:t>
+              <a:t>2015-04-17</a:t>
             </a:fld>
             <a:endParaRPr lang="en-US"/>
           </a:p>
@@ -413,7 +413,7 @@
           <a:p>
             <a:fld id="{DCA522CA-1398-4DDF-81D3-E4C239679051}" type="datetimeFigureOut">
               <a:rPr lang="en-US" smtClean="0"/>
-              <a:t>4/16/2015</a:t>
+              <a:t>2015-04-17</a:t>
             </a:fld>
             <a:endParaRPr lang="en-US"/>
           </a:p>
@@ -593,7 +593,7 @@
           <a:p>
             <a:fld id="{DCA522CA-1398-4DDF-81D3-E4C239679051}" type="datetimeFigureOut">
               <a:rPr lang="en-US" smtClean="0"/>
-              <a:t>4/16/2015</a:t>
+              <a:t>2015-04-17</a:t>
             </a:fld>
             <a:endParaRPr lang="en-US"/>
           </a:p>
@@ -763,7 +763,7 @@
           <a:p>
             <a:fld id="{DCA522CA-1398-4DDF-81D3-E4C239679051}" type="datetimeFigureOut">
               <a:rPr lang="en-US" smtClean="0"/>
-              <a:t>4/16/2015</a:t>
+              <a:t>2015-04-17</a:t>
             </a:fld>
             <a:endParaRPr lang="en-US"/>
           </a:p>
@@ -1009,7 +1009,7 @@
           <a:p>
             <a:fld id="{DCA522CA-1398-4DDF-81D3-E4C239679051}" type="datetimeFigureOut">
               <a:rPr lang="en-US" smtClean="0"/>
-              <a:t>4/16/2015</a:t>
+              <a:t>2015-04-17</a:t>
             </a:fld>
             <a:endParaRPr lang="en-US"/>
           </a:p>
@@ -1241,7 +1241,7 @@
           <a:p>
             <a:fld id="{DCA522CA-1398-4DDF-81D3-E4C239679051}" type="datetimeFigureOut">
               <a:rPr lang="en-US" smtClean="0"/>
-              <a:t>4/16/2015</a:t>
+              <a:t>2015-04-17</a:t>
             </a:fld>
             <a:endParaRPr lang="en-US"/>
           </a:p>
@@ -1608,7 +1608,7 @@
           <a:p>
             <a:fld id="{DCA522CA-1398-4DDF-81D3-E4C239679051}" type="datetimeFigureOut">
               <a:rPr lang="en-US" smtClean="0"/>
-              <a:t>4/16/2015</a:t>
+              <a:t>2015-04-17</a:t>
             </a:fld>
             <a:endParaRPr lang="en-US"/>
           </a:p>
@@ -1726,7 +1726,7 @@
           <a:p>
             <a:fld id="{DCA522CA-1398-4DDF-81D3-E4C239679051}" type="datetimeFigureOut">
               <a:rPr lang="en-US" smtClean="0"/>
-              <a:t>4/16/2015</a:t>
+              <a:t>2015-04-17</a:t>
             </a:fld>
             <a:endParaRPr lang="en-US"/>
           </a:p>
@@ -1821,7 +1821,7 @@
           <a:p>
             <a:fld id="{DCA522CA-1398-4DDF-81D3-E4C239679051}" type="datetimeFigureOut">
               <a:rPr lang="en-US" smtClean="0"/>
-              <a:t>4/16/2015</a:t>
+              <a:t>2015-04-17</a:t>
             </a:fld>
             <a:endParaRPr lang="en-US"/>
           </a:p>
@@ -2098,7 +2098,7 @@
           <a:p>
             <a:fld id="{DCA522CA-1398-4DDF-81D3-E4C239679051}" type="datetimeFigureOut">
               <a:rPr lang="en-US" smtClean="0"/>
-              <a:t>4/16/2015</a:t>
+              <a:t>2015-04-17</a:t>
             </a:fld>
             <a:endParaRPr lang="en-US"/>
           </a:p>
@@ -2351,7 +2351,7 @@
           <a:p>
             <a:fld id="{DCA522CA-1398-4DDF-81D3-E4C239679051}" type="datetimeFigureOut">
               <a:rPr lang="en-US" smtClean="0"/>
-              <a:t>4/16/2015</a:t>
+              <a:t>2015-04-17</a:t>
             </a:fld>
             <a:endParaRPr lang="en-US"/>
           </a:p>
@@ -2564,7 +2564,7 @@
           <a:p>
             <a:fld id="{DCA522CA-1398-4DDF-81D3-E4C239679051}" type="datetimeFigureOut">
               <a:rPr lang="en-US" smtClean="0"/>
-              <a:t>4/16/2015</a:t>
+              <a:t>2015-04-17</a:t>
             </a:fld>
             <a:endParaRPr lang="en-US"/>
           </a:p>
@@ -2969,1316 +2969,1308 @@
           <a:chExt cx="0" cy="0"/>
         </a:xfrm>
       </p:grpSpPr>
-      <p:grpSp>
-        <p:nvGrpSpPr>
-          <p:cNvPr id="11" name="Group 10"/>
-          <p:cNvGrpSpPr/>
+      <p:sp>
+        <p:nvSpPr>
+          <p:cNvPr id="4" name="Rectangle 3"/>
+          <p:cNvSpPr/>
           <p:nvPr/>
-        </p:nvGrpSpPr>
-        <p:grpSpPr>
-          <a:xfrm>
-            <a:off x="1543663" y="2202288"/>
-            <a:ext cx="7922308" cy="2078159"/>
-            <a:chOff x="1543663" y="2202288"/>
-            <a:chExt cx="7922308" cy="2078159"/>
-          </a:xfrm>
-        </p:grpSpPr>
-        <p:sp>
-          <p:nvSpPr>
-            <p:cNvPr id="4" name="Rectangle 3"/>
-            <p:cNvSpPr/>
-            <p:nvPr/>
-          </p:nvSpPr>
-          <p:spPr>
-            <a:xfrm>
-              <a:off x="3271234" y="2215167"/>
-              <a:ext cx="1068946" cy="450760"/>
-            </a:xfrm>
-            <a:prstGeom prst="rect">
-              <a:avLst/>
-            </a:prstGeom>
-            <a:noFill/>
-          </p:spPr>
-          <p:style>
-            <a:lnRef idx="2">
-              <a:schemeClr val="accent1">
-                <a:shade val="50000"/>
-              </a:schemeClr>
-            </a:lnRef>
-            <a:fillRef idx="1">
-              <a:schemeClr val="accent1"/>
-            </a:fillRef>
-            <a:effectRef idx="0">
-              <a:schemeClr val="accent1"/>
-            </a:effectRef>
-            <a:fontRef idx="minor">
-              <a:schemeClr val="lt1"/>
-            </a:fontRef>
-          </p:style>
-          <p:txBody>
-            <a:bodyPr rtlCol="0" anchor="ctr"/>
-            <a:lstStyle/>
-            <a:p>
-              <a:pPr algn="ctr"/>
-              <a:r>
-                <a:rPr lang="en-US" sz="1200" b="1" dirty="0" smtClean="0">
-                  <a:solidFill>
-                    <a:schemeClr val="tx1"/>
-                  </a:solidFill>
-                </a:rPr>
-                <a:t>Preprocessing</a:t>
-              </a:r>
-              <a:endParaRPr lang="en-US" sz="1200" b="1" dirty="0">
+        </p:nvSpPr>
+        <p:spPr>
+          <a:xfrm>
+            <a:off x="3308585" y="2065741"/>
+            <a:ext cx="1068946" cy="450760"/>
+          </a:xfrm>
+          <a:prstGeom prst="rect">
+            <a:avLst/>
+          </a:prstGeom>
+          <a:noFill/>
+        </p:spPr>
+        <p:style>
+          <a:lnRef idx="2">
+            <a:schemeClr val="accent1">
+              <a:shade val="50000"/>
+            </a:schemeClr>
+          </a:lnRef>
+          <a:fillRef idx="1">
+            <a:schemeClr val="accent1"/>
+          </a:fillRef>
+          <a:effectRef idx="0">
+            <a:schemeClr val="accent1"/>
+          </a:effectRef>
+          <a:fontRef idx="minor">
+            <a:schemeClr val="lt1"/>
+          </a:fontRef>
+        </p:style>
+        <p:txBody>
+          <a:bodyPr rtlCol="0" anchor="ctr"/>
+          <a:lstStyle/>
+          <a:p>
+            <a:pPr algn="ctr"/>
+            <a:r>
+              <a:rPr lang="en-US" sz="1400" b="1" dirty="0" smtClean="0">
                 <a:solidFill>
                   <a:schemeClr val="tx1"/>
                 </a:solidFill>
-              </a:endParaRPr>
-            </a:p>
-          </p:txBody>
-        </p:sp>
-        <p:sp>
-          <p:nvSpPr>
-            <p:cNvPr id="6" name="Rectangle 5"/>
-            <p:cNvSpPr/>
-            <p:nvPr/>
-          </p:nvSpPr>
-          <p:spPr>
-            <a:xfrm>
-              <a:off x="4951929" y="2215167"/>
-              <a:ext cx="918692" cy="450760"/>
-            </a:xfrm>
-            <a:prstGeom prst="rect">
-              <a:avLst/>
-            </a:prstGeom>
-            <a:noFill/>
-          </p:spPr>
-          <p:style>
-            <a:lnRef idx="2">
-              <a:schemeClr val="accent1">
-                <a:shade val="50000"/>
-              </a:schemeClr>
-            </a:lnRef>
-            <a:fillRef idx="1">
-              <a:schemeClr val="accent1"/>
-            </a:fillRef>
-            <a:effectRef idx="0">
-              <a:schemeClr val="accent1"/>
-            </a:effectRef>
-            <a:fontRef idx="minor">
-              <a:schemeClr val="lt1"/>
-            </a:fontRef>
-          </p:style>
-          <p:txBody>
-            <a:bodyPr rtlCol="0" anchor="ctr"/>
-            <a:lstStyle/>
-            <a:p>
-              <a:pPr algn="ctr"/>
-              <a:r>
-                <a:rPr lang="en-US" sz="1200" b="1" dirty="0" smtClean="0">
-                  <a:solidFill>
-                    <a:schemeClr val="tx1"/>
-                  </a:solidFill>
-                </a:rPr>
-                <a:t>Windowing</a:t>
-              </a:r>
-              <a:endParaRPr lang="en-US" sz="1200" b="1" dirty="0">
+              </a:rPr>
+              <a:t>Pre-processing</a:t>
+            </a:r>
+            <a:endParaRPr lang="en-US" sz="1400" b="1" dirty="0">
+              <a:solidFill>
+                <a:schemeClr val="tx1"/>
+              </a:solidFill>
+            </a:endParaRPr>
+          </a:p>
+        </p:txBody>
+      </p:sp>
+      <p:sp>
+        <p:nvSpPr>
+          <p:cNvPr id="6" name="Rectangle 5"/>
+          <p:cNvSpPr/>
+          <p:nvPr/>
+        </p:nvSpPr>
+        <p:spPr>
+          <a:xfrm>
+            <a:off x="4690479" y="2663437"/>
+            <a:ext cx="1049137" cy="450760"/>
+          </a:xfrm>
+          <a:prstGeom prst="rect">
+            <a:avLst/>
+          </a:prstGeom>
+          <a:noFill/>
+        </p:spPr>
+        <p:style>
+          <a:lnRef idx="2">
+            <a:schemeClr val="accent1">
+              <a:shade val="50000"/>
+            </a:schemeClr>
+          </a:lnRef>
+          <a:fillRef idx="1">
+            <a:schemeClr val="accent1"/>
+          </a:fillRef>
+          <a:effectRef idx="0">
+            <a:schemeClr val="accent1"/>
+          </a:effectRef>
+          <a:fontRef idx="minor">
+            <a:schemeClr val="lt1"/>
+          </a:fontRef>
+        </p:style>
+        <p:txBody>
+          <a:bodyPr rtlCol="0" anchor="ctr"/>
+          <a:lstStyle/>
+          <a:p>
+            <a:pPr algn="ctr"/>
+            <a:r>
+              <a:rPr lang="en-US" sz="1400" b="1" dirty="0" smtClean="0">
                 <a:solidFill>
                   <a:schemeClr val="tx1"/>
                 </a:solidFill>
-              </a:endParaRPr>
-            </a:p>
-          </p:txBody>
-        </p:sp>
-        <p:sp>
-          <p:nvSpPr>
-            <p:cNvPr id="7" name="Rectangle 6"/>
-            <p:cNvSpPr/>
-            <p:nvPr/>
-          </p:nvSpPr>
-          <p:spPr>
-            <a:xfrm>
-              <a:off x="6495248" y="2215167"/>
-              <a:ext cx="1129046" cy="450760"/>
-            </a:xfrm>
-            <a:prstGeom prst="rect">
-              <a:avLst/>
-            </a:prstGeom>
-            <a:noFill/>
-          </p:spPr>
-          <p:style>
-            <a:lnRef idx="2">
-              <a:schemeClr val="accent1">
-                <a:shade val="50000"/>
-              </a:schemeClr>
-            </a:lnRef>
-            <a:fillRef idx="1">
-              <a:schemeClr val="accent1"/>
-            </a:fillRef>
-            <a:effectRef idx="0">
-              <a:schemeClr val="accent1"/>
-            </a:effectRef>
-            <a:fontRef idx="minor">
-              <a:schemeClr val="lt1"/>
-            </a:fontRef>
-          </p:style>
-          <p:txBody>
-            <a:bodyPr rtlCol="0" anchor="ctr"/>
-            <a:lstStyle/>
-            <a:p>
-              <a:pPr algn="ctr"/>
-              <a:r>
-                <a:rPr lang="en-US" sz="1200" b="1" dirty="0" smtClean="0">
-                  <a:solidFill>
-                    <a:schemeClr val="tx1"/>
-                  </a:solidFill>
-                </a:rPr>
-                <a:t>Feature Extraction</a:t>
-              </a:r>
-              <a:endParaRPr lang="en-US" sz="1200" b="1" dirty="0">
+              </a:rPr>
+              <a:t>Windowing</a:t>
+            </a:r>
+            <a:endParaRPr lang="en-US" sz="1400" b="1" dirty="0">
+              <a:solidFill>
+                <a:schemeClr val="tx1"/>
+              </a:solidFill>
+            </a:endParaRPr>
+          </a:p>
+        </p:txBody>
+      </p:sp>
+      <p:sp>
+        <p:nvSpPr>
+          <p:cNvPr id="7" name="Rectangle 6"/>
+          <p:cNvSpPr/>
+          <p:nvPr/>
+        </p:nvSpPr>
+        <p:spPr>
+          <a:xfrm>
+            <a:off x="6146649" y="2065741"/>
+            <a:ext cx="1129046" cy="450760"/>
+          </a:xfrm>
+          <a:prstGeom prst="rect">
+            <a:avLst/>
+          </a:prstGeom>
+          <a:noFill/>
+        </p:spPr>
+        <p:style>
+          <a:lnRef idx="2">
+            <a:schemeClr val="accent1">
+              <a:shade val="50000"/>
+            </a:schemeClr>
+          </a:lnRef>
+          <a:fillRef idx="1">
+            <a:schemeClr val="accent1"/>
+          </a:fillRef>
+          <a:effectRef idx="0">
+            <a:schemeClr val="accent1"/>
+          </a:effectRef>
+          <a:fontRef idx="minor">
+            <a:schemeClr val="lt1"/>
+          </a:fontRef>
+        </p:style>
+        <p:txBody>
+          <a:bodyPr rtlCol="0" anchor="ctr"/>
+          <a:lstStyle/>
+          <a:p>
+            <a:pPr algn="ctr"/>
+            <a:r>
+              <a:rPr lang="en-US" sz="1400" b="1" dirty="0" smtClean="0">
                 <a:solidFill>
                   <a:schemeClr val="tx1"/>
                 </a:solidFill>
-              </a:endParaRPr>
-            </a:p>
-          </p:txBody>
-        </p:sp>
-        <p:sp>
-          <p:nvSpPr>
-            <p:cNvPr id="8" name="Rectangle 7"/>
-            <p:cNvSpPr/>
-            <p:nvPr/>
-          </p:nvSpPr>
-          <p:spPr>
-            <a:xfrm>
-              <a:off x="8351944" y="2215167"/>
-              <a:ext cx="1114027" cy="445534"/>
-            </a:xfrm>
-            <a:prstGeom prst="rect">
-              <a:avLst/>
-            </a:prstGeom>
-            <a:noFill/>
-          </p:spPr>
-          <p:style>
-            <a:lnRef idx="2">
-              <a:schemeClr val="accent1">
-                <a:shade val="50000"/>
-              </a:schemeClr>
-            </a:lnRef>
-            <a:fillRef idx="1">
-              <a:schemeClr val="accent1"/>
-            </a:fillRef>
-            <a:effectRef idx="0">
-              <a:schemeClr val="accent1"/>
-            </a:effectRef>
-            <a:fontRef idx="minor">
-              <a:schemeClr val="lt1"/>
-            </a:fontRef>
-          </p:style>
-          <p:txBody>
-            <a:bodyPr rtlCol="0" anchor="ctr"/>
-            <a:lstStyle/>
-            <a:p>
-              <a:pPr algn="ctr"/>
-              <a:r>
-                <a:rPr lang="en-US" sz="1200" b="1" dirty="0">
-                  <a:solidFill>
-                    <a:schemeClr val="tx1"/>
-                  </a:solidFill>
-                </a:rPr>
-                <a:t>C</a:t>
-              </a:r>
-              <a:r>
-                <a:rPr lang="en-US" sz="1200" b="1" dirty="0" smtClean="0">
-                  <a:solidFill>
-                    <a:schemeClr val="tx1"/>
-                  </a:solidFill>
-                </a:rPr>
-                <a:t>lassification</a:t>
-              </a:r>
-              <a:endParaRPr lang="en-US" sz="1200" b="1" dirty="0">
+              </a:rPr>
+              <a:t>Feature Extraction</a:t>
+            </a:r>
+            <a:endParaRPr lang="en-US" sz="1400" b="1" dirty="0">
+              <a:solidFill>
+                <a:schemeClr val="tx1"/>
+              </a:solidFill>
+            </a:endParaRPr>
+          </a:p>
+        </p:txBody>
+      </p:sp>
+      <p:sp>
+        <p:nvSpPr>
+          <p:cNvPr id="8" name="Rectangle 7"/>
+          <p:cNvSpPr/>
+          <p:nvPr/>
+        </p:nvSpPr>
+        <p:spPr>
+          <a:xfrm>
+            <a:off x="8003345" y="2065741"/>
+            <a:ext cx="1234813" cy="445534"/>
+          </a:xfrm>
+          <a:prstGeom prst="rect">
+            <a:avLst/>
+          </a:prstGeom>
+          <a:noFill/>
+        </p:spPr>
+        <p:style>
+          <a:lnRef idx="2">
+            <a:schemeClr val="accent1">
+              <a:shade val="50000"/>
+            </a:schemeClr>
+          </a:lnRef>
+          <a:fillRef idx="1">
+            <a:schemeClr val="accent1"/>
+          </a:fillRef>
+          <a:effectRef idx="0">
+            <a:schemeClr val="accent1"/>
+          </a:effectRef>
+          <a:fontRef idx="minor">
+            <a:schemeClr val="lt1"/>
+          </a:fontRef>
+        </p:style>
+        <p:txBody>
+          <a:bodyPr rtlCol="0" anchor="ctr"/>
+          <a:lstStyle/>
+          <a:p>
+            <a:pPr algn="ctr"/>
+            <a:r>
+              <a:rPr lang="en-US" sz="1400" b="1" dirty="0">
                 <a:solidFill>
                   <a:schemeClr val="tx1"/>
                 </a:solidFill>
-              </a:endParaRPr>
-            </a:p>
-          </p:txBody>
-        </p:sp>
-        <p:sp>
-          <p:nvSpPr>
-            <p:cNvPr id="20" name="Oval 19"/>
-            <p:cNvSpPr/>
-            <p:nvPr/>
-          </p:nvSpPr>
-          <p:spPr>
-            <a:xfrm>
-              <a:off x="8432442" y="3016066"/>
-              <a:ext cx="943374" cy="447350"/>
-            </a:xfrm>
-            <a:prstGeom prst="ellipse">
-              <a:avLst/>
-            </a:prstGeom>
-            <a:noFill/>
-            <a:ln>
+              </a:rPr>
+              <a:t>C</a:t>
+            </a:r>
+            <a:r>
+              <a:rPr lang="en-US" sz="1400" b="1" dirty="0" smtClean="0">
+                <a:solidFill>
+                  <a:schemeClr val="tx1"/>
+                </a:solidFill>
+              </a:rPr>
+              <a:t>lassification</a:t>
+            </a:r>
+            <a:endParaRPr lang="en-US" sz="1400" b="1" dirty="0">
               <a:solidFill>
                 <a:schemeClr val="tx1"/>
               </a:solidFill>
-            </a:ln>
-          </p:spPr>
-          <p:style>
-            <a:lnRef idx="2">
-              <a:schemeClr val="accent1">
-                <a:shade val="50000"/>
-              </a:schemeClr>
-            </a:lnRef>
-            <a:fillRef idx="1">
-              <a:schemeClr val="accent1"/>
-            </a:fillRef>
-            <a:effectRef idx="0">
-              <a:schemeClr val="accent1"/>
-            </a:effectRef>
-            <a:fontRef idx="minor">
-              <a:schemeClr val="lt1"/>
-            </a:fontRef>
-          </p:style>
-          <p:txBody>
-            <a:bodyPr rtlCol="0" anchor="ctr"/>
-            <a:lstStyle/>
-            <a:p>
-              <a:pPr algn="ctr"/>
-              <a:r>
-                <a:rPr lang="en-US" sz="1200" b="1" dirty="0">
-                  <a:solidFill>
-                    <a:schemeClr val="tx1"/>
-                  </a:solidFill>
-                </a:rPr>
-                <a:t>m</a:t>
-              </a:r>
-              <a:r>
-                <a:rPr lang="en-US" sz="1200" b="1" dirty="0" smtClean="0">
-                  <a:solidFill>
-                    <a:schemeClr val="tx1"/>
-                  </a:solidFill>
-                </a:rPr>
-                <a:t>odel</a:t>
-              </a:r>
-              <a:endParaRPr lang="en-US" sz="1200" b="1" dirty="0">
+            </a:endParaRPr>
+          </a:p>
+        </p:txBody>
+      </p:sp>
+      <p:sp>
+        <p:nvSpPr>
+          <p:cNvPr id="20" name="Oval 19"/>
+          <p:cNvSpPr/>
+          <p:nvPr/>
+        </p:nvSpPr>
+        <p:spPr>
+          <a:xfrm>
+            <a:off x="8170993" y="3177740"/>
+            <a:ext cx="943374" cy="447350"/>
+          </a:xfrm>
+          <a:prstGeom prst="ellipse">
+            <a:avLst/>
+          </a:prstGeom>
+          <a:noFill/>
+          <a:ln>
+            <a:solidFill>
+              <a:schemeClr val="tx1"/>
+            </a:solidFill>
+          </a:ln>
+        </p:spPr>
+        <p:style>
+          <a:lnRef idx="2">
+            <a:schemeClr val="accent1">
+              <a:shade val="50000"/>
+            </a:schemeClr>
+          </a:lnRef>
+          <a:fillRef idx="1">
+            <a:schemeClr val="accent1"/>
+          </a:fillRef>
+          <a:effectRef idx="0">
+            <a:schemeClr val="accent1"/>
+          </a:effectRef>
+          <a:fontRef idx="minor">
+            <a:schemeClr val="lt1"/>
+          </a:fontRef>
+        </p:style>
+        <p:txBody>
+          <a:bodyPr rtlCol="0" anchor="ctr"/>
+          <a:lstStyle/>
+          <a:p>
+            <a:pPr algn="ctr"/>
+            <a:r>
+              <a:rPr lang="en-US" sz="1400" b="1" dirty="0">
                 <a:solidFill>
                   <a:schemeClr val="tx1"/>
                 </a:solidFill>
-              </a:endParaRPr>
-            </a:p>
-          </p:txBody>
-        </p:sp>
-        <p:cxnSp>
-          <p:nvCxnSpPr>
-            <p:cNvPr id="22" name="Straight Arrow Connector 21"/>
-            <p:cNvCxnSpPr>
-              <a:stCxn id="8" idx="2"/>
-              <a:endCxn id="20" idx="0"/>
-            </p:cNvCxnSpPr>
-            <p:nvPr/>
-          </p:nvCxnSpPr>
-          <p:spPr>
-            <a:xfrm flipH="1">
-              <a:off x="8904129" y="2660701"/>
-              <a:ext cx="4829" cy="355365"/>
-            </a:xfrm>
-            <a:prstGeom prst="straightConnector1">
-              <a:avLst/>
-            </a:prstGeom>
-            <a:ln>
+              </a:rPr>
+              <a:t>m</a:t>
+            </a:r>
+            <a:r>
+              <a:rPr lang="en-US" sz="1400" b="1" dirty="0" smtClean="0">
+                <a:solidFill>
+                  <a:schemeClr val="tx1"/>
+                </a:solidFill>
+              </a:rPr>
+              <a:t>odel</a:t>
+            </a:r>
+            <a:endParaRPr lang="en-US" sz="1400" b="1" dirty="0">
               <a:solidFill>
                 <a:schemeClr val="tx1"/>
               </a:solidFill>
-              <a:tailEnd type="triangle"/>
-            </a:ln>
-          </p:spPr>
-          <p:style>
-            <a:lnRef idx="1">
-              <a:schemeClr val="accent1"/>
-            </a:lnRef>
-            <a:fillRef idx="0">
-              <a:schemeClr val="accent1"/>
-            </a:fillRef>
-            <a:effectRef idx="0">
-              <a:schemeClr val="accent1"/>
-            </a:effectRef>
-            <a:fontRef idx="minor">
+            </a:endParaRPr>
+          </a:p>
+        </p:txBody>
+      </p:sp>
+      <p:cxnSp>
+        <p:nvCxnSpPr>
+          <p:cNvPr id="22" name="Straight Arrow Connector 21"/>
+          <p:cNvCxnSpPr>
+            <a:stCxn id="8" idx="2"/>
+            <a:endCxn id="20" idx="0"/>
+          </p:cNvCxnSpPr>
+          <p:nvPr/>
+        </p:nvCxnSpPr>
+        <p:spPr>
+          <a:xfrm>
+            <a:off x="8620752" y="2511275"/>
+            <a:ext cx="21928" cy="666465"/>
+          </a:xfrm>
+          <a:prstGeom prst="straightConnector1">
+            <a:avLst/>
+          </a:prstGeom>
+          <a:ln>
+            <a:solidFill>
               <a:schemeClr val="tx1"/>
-            </a:fontRef>
-          </p:style>
-        </p:cxnSp>
-        <p:cxnSp>
-          <p:nvCxnSpPr>
-            <p:cNvPr id="28" name="Straight Arrow Connector 27"/>
-            <p:cNvCxnSpPr/>
-            <p:nvPr/>
-          </p:nvCxnSpPr>
-          <p:spPr>
-            <a:xfrm>
-              <a:off x="8918605" y="3463416"/>
-              <a:ext cx="0" cy="336997"/>
-            </a:xfrm>
-            <a:prstGeom prst="straightConnector1">
-              <a:avLst/>
-            </a:prstGeom>
-            <a:ln>
+            </a:solidFill>
+            <a:tailEnd type="triangle"/>
+          </a:ln>
+        </p:spPr>
+        <p:style>
+          <a:lnRef idx="1">
+            <a:schemeClr val="accent1"/>
+          </a:lnRef>
+          <a:fillRef idx="0">
+            <a:schemeClr val="accent1"/>
+          </a:fillRef>
+          <a:effectRef idx="0">
+            <a:schemeClr val="accent1"/>
+          </a:effectRef>
+          <a:fontRef idx="minor">
+            <a:schemeClr val="tx1"/>
+          </a:fontRef>
+        </p:style>
+      </p:cxnSp>
+      <p:cxnSp>
+        <p:nvCxnSpPr>
+          <p:cNvPr id="28" name="Straight Arrow Connector 27"/>
+          <p:cNvCxnSpPr>
+            <a:stCxn id="20" idx="4"/>
+            <a:endCxn id="51" idx="0"/>
+          </p:cNvCxnSpPr>
+          <p:nvPr/>
+        </p:nvCxnSpPr>
+        <p:spPr>
+          <a:xfrm>
+            <a:off x="8642680" y="3625090"/>
+            <a:ext cx="4400" cy="529893"/>
+          </a:xfrm>
+          <a:prstGeom prst="straightConnector1">
+            <a:avLst/>
+          </a:prstGeom>
+          <a:ln>
+            <a:solidFill>
+              <a:schemeClr val="tx1"/>
+            </a:solidFill>
+            <a:tailEnd type="triangle"/>
+          </a:ln>
+        </p:spPr>
+        <p:style>
+          <a:lnRef idx="1">
+            <a:schemeClr val="accent1"/>
+          </a:lnRef>
+          <a:fillRef idx="0">
+            <a:schemeClr val="accent1"/>
+          </a:fillRef>
+          <a:effectRef idx="0">
+            <a:schemeClr val="accent1"/>
+          </a:effectRef>
+          <a:fontRef idx="minor">
+            <a:schemeClr val="tx1"/>
+          </a:fontRef>
+        </p:style>
+      </p:cxnSp>
+      <p:sp>
+        <p:nvSpPr>
+          <p:cNvPr id="35" name="TextBox 34"/>
+          <p:cNvSpPr txBox="1"/>
+          <p:nvPr/>
+        </p:nvSpPr>
+        <p:spPr>
+          <a:xfrm>
+            <a:off x="4303478" y="2052862"/>
+            <a:ext cx="734096" cy="463639"/>
+          </a:xfrm>
+          <a:prstGeom prst="rect">
+            <a:avLst/>
+          </a:prstGeom>
+          <a:noFill/>
+        </p:spPr>
+        <p:txBody>
+          <a:bodyPr wrap="square" rtlCol="0">
+            <a:spAutoFit/>
+          </a:bodyPr>
+          <a:lstStyle/>
+          <a:p>
+            <a:pPr algn="ctr"/>
+            <a:r>
+              <a:rPr lang="en-US" sz="1200" dirty="0" smtClean="0"/>
+              <a:t>pressure values</a:t>
+            </a:r>
+            <a:endParaRPr lang="en-US" sz="1200" dirty="0"/>
+          </a:p>
+        </p:txBody>
+      </p:sp>
+      <p:sp>
+        <p:nvSpPr>
+          <p:cNvPr id="36" name="TextBox 35"/>
+          <p:cNvSpPr txBox="1"/>
+          <p:nvPr/>
+        </p:nvSpPr>
+        <p:spPr>
+          <a:xfrm>
+            <a:off x="5303079" y="2065742"/>
+            <a:ext cx="991673" cy="461665"/>
+          </a:xfrm>
+          <a:prstGeom prst="rect">
+            <a:avLst/>
+          </a:prstGeom>
+          <a:noFill/>
+        </p:spPr>
+        <p:txBody>
+          <a:bodyPr wrap="square" rtlCol="0">
+            <a:spAutoFit/>
+          </a:bodyPr>
+          <a:lstStyle/>
+          <a:p>
+            <a:pPr algn="ctr"/>
+            <a:r>
+              <a:rPr lang="en-US" sz="1200" dirty="0" smtClean="0"/>
+              <a:t>window </a:t>
+            </a:r>
+            <a:r>
+              <a:rPr lang="en-US" sz="1200" dirty="0"/>
+              <a:t>values</a:t>
+            </a:r>
+          </a:p>
+        </p:txBody>
+      </p:sp>
+      <p:sp>
+        <p:nvSpPr>
+          <p:cNvPr id="37" name="TextBox 36"/>
+          <p:cNvSpPr txBox="1"/>
+          <p:nvPr/>
+        </p:nvSpPr>
+        <p:spPr>
+          <a:xfrm>
+            <a:off x="7130807" y="2065742"/>
+            <a:ext cx="991673" cy="461665"/>
+          </a:xfrm>
+          <a:prstGeom prst="rect">
+            <a:avLst/>
+          </a:prstGeom>
+          <a:noFill/>
+        </p:spPr>
+        <p:txBody>
+          <a:bodyPr wrap="square" rtlCol="0">
+            <a:spAutoFit/>
+          </a:bodyPr>
+          <a:lstStyle/>
+          <a:p>
+            <a:pPr algn="ctr"/>
+            <a:r>
+              <a:rPr lang="en-US" sz="1200" dirty="0" smtClean="0"/>
+              <a:t>window </a:t>
+            </a:r>
+            <a:r>
+              <a:rPr lang="en-US" sz="1200" dirty="0"/>
+              <a:t>features</a:t>
+            </a:r>
+          </a:p>
+        </p:txBody>
+      </p:sp>
+      <p:cxnSp>
+        <p:nvCxnSpPr>
+          <p:cNvPr id="39" name="Straight Arrow Connector 38"/>
+          <p:cNvCxnSpPr>
+            <a:stCxn id="4" idx="3"/>
+            <a:endCxn id="6" idx="1"/>
+          </p:cNvCxnSpPr>
+          <p:nvPr/>
+        </p:nvCxnSpPr>
+        <p:spPr>
+          <a:xfrm>
+            <a:off x="4377531" y="2291121"/>
+            <a:ext cx="312948" cy="597696"/>
+          </a:xfrm>
+          <a:prstGeom prst="straightConnector1">
+            <a:avLst/>
+          </a:prstGeom>
+          <a:ln>
+            <a:tailEnd type="triangle"/>
+          </a:ln>
+        </p:spPr>
+        <p:style>
+          <a:lnRef idx="1">
+            <a:schemeClr val="accent1"/>
+          </a:lnRef>
+          <a:fillRef idx="0">
+            <a:schemeClr val="accent1"/>
+          </a:fillRef>
+          <a:effectRef idx="0">
+            <a:schemeClr val="accent1"/>
+          </a:effectRef>
+          <a:fontRef idx="minor">
+            <a:schemeClr val="tx1"/>
+          </a:fontRef>
+        </p:style>
+      </p:cxnSp>
+      <p:cxnSp>
+        <p:nvCxnSpPr>
+          <p:cNvPr id="40" name="Straight Arrow Connector 39"/>
+          <p:cNvCxnSpPr>
+            <a:stCxn id="6" idx="3"/>
+          </p:cNvCxnSpPr>
+          <p:nvPr/>
+        </p:nvCxnSpPr>
+        <p:spPr>
+          <a:xfrm flipV="1">
+            <a:off x="5739616" y="2291121"/>
+            <a:ext cx="494184" cy="597696"/>
+          </a:xfrm>
+          <a:prstGeom prst="straightConnector1">
+            <a:avLst/>
+          </a:prstGeom>
+          <a:ln>
+            <a:tailEnd type="triangle"/>
+          </a:ln>
+        </p:spPr>
+        <p:style>
+          <a:lnRef idx="1">
+            <a:schemeClr val="accent1"/>
+          </a:lnRef>
+          <a:fillRef idx="0">
+            <a:schemeClr val="accent1"/>
+          </a:fillRef>
+          <a:effectRef idx="0">
+            <a:schemeClr val="accent1"/>
+          </a:effectRef>
+          <a:fontRef idx="minor">
+            <a:schemeClr val="tx1"/>
+          </a:fontRef>
+        </p:style>
+      </p:cxnSp>
+      <p:cxnSp>
+        <p:nvCxnSpPr>
+          <p:cNvPr id="41" name="Straight Arrow Connector 40"/>
+          <p:cNvCxnSpPr/>
+          <p:nvPr/>
+        </p:nvCxnSpPr>
+        <p:spPr>
+          <a:xfrm>
+            <a:off x="7275695" y="2291121"/>
+            <a:ext cx="701902" cy="0"/>
+          </a:xfrm>
+          <a:prstGeom prst="straightConnector1">
+            <a:avLst/>
+          </a:prstGeom>
+          <a:ln>
+            <a:tailEnd type="triangle"/>
+          </a:ln>
+        </p:spPr>
+        <p:style>
+          <a:lnRef idx="1">
+            <a:schemeClr val="accent1"/>
+          </a:lnRef>
+          <a:fillRef idx="0">
+            <a:schemeClr val="accent1"/>
+          </a:fillRef>
+          <a:effectRef idx="0">
+            <a:schemeClr val="accent1"/>
+          </a:effectRef>
+          <a:fontRef idx="minor">
+            <a:schemeClr val="tx1"/>
+          </a:fontRef>
+        </p:style>
+      </p:cxnSp>
+      <p:sp>
+        <p:nvSpPr>
+          <p:cNvPr id="44" name="TextBox 43"/>
+          <p:cNvSpPr txBox="1"/>
+          <p:nvPr/>
+        </p:nvSpPr>
+        <p:spPr>
+          <a:xfrm>
+            <a:off x="7903543" y="2539196"/>
+            <a:ext cx="991673" cy="276999"/>
+          </a:xfrm>
+          <a:prstGeom prst="rect">
+            <a:avLst/>
+          </a:prstGeom>
+          <a:noFill/>
+        </p:spPr>
+        <p:txBody>
+          <a:bodyPr wrap="square" rtlCol="0">
+            <a:spAutoFit/>
+          </a:bodyPr>
+          <a:lstStyle/>
+          <a:p>
+            <a:pPr algn="ctr"/>
+            <a:r>
+              <a:rPr lang="en-US" sz="1200" dirty="0" smtClean="0"/>
+              <a:t>save</a:t>
+            </a:r>
+            <a:endParaRPr lang="en-US" sz="1200" dirty="0"/>
+          </a:p>
+        </p:txBody>
+      </p:sp>
+      <p:sp>
+        <p:nvSpPr>
+          <p:cNvPr id="48" name="Rectangle 47"/>
+          <p:cNvSpPr/>
+          <p:nvPr/>
+        </p:nvSpPr>
+        <p:spPr>
+          <a:xfrm>
+            <a:off x="3308585" y="4154983"/>
+            <a:ext cx="1081825" cy="450760"/>
+          </a:xfrm>
+          <a:prstGeom prst="rect">
+            <a:avLst/>
+          </a:prstGeom>
+          <a:noFill/>
+        </p:spPr>
+        <p:style>
+          <a:lnRef idx="2">
+            <a:schemeClr val="accent1">
+              <a:shade val="50000"/>
+            </a:schemeClr>
+          </a:lnRef>
+          <a:fillRef idx="1">
+            <a:schemeClr val="accent1"/>
+          </a:fillRef>
+          <a:effectRef idx="0">
+            <a:schemeClr val="accent1"/>
+          </a:effectRef>
+          <a:fontRef idx="minor">
+            <a:schemeClr val="lt1"/>
+          </a:fontRef>
+        </p:style>
+        <p:txBody>
+          <a:bodyPr rtlCol="0" anchor="ctr"/>
+          <a:lstStyle/>
+          <a:p>
+            <a:pPr algn="ctr"/>
+            <a:r>
+              <a:rPr lang="en-US" sz="1400" b="1" dirty="0" smtClean="0">
+                <a:solidFill>
+                  <a:schemeClr val="tx1"/>
+                </a:solidFill>
+              </a:rPr>
+              <a:t>Pre-processing</a:t>
+            </a:r>
+            <a:endParaRPr lang="en-US" sz="1400" b="1" dirty="0">
               <a:solidFill>
                 <a:schemeClr val="tx1"/>
               </a:solidFill>
-              <a:tailEnd type="triangle"/>
-            </a:ln>
-          </p:spPr>
-          <p:style>
-            <a:lnRef idx="1">
-              <a:schemeClr val="accent1"/>
-            </a:lnRef>
-            <a:fillRef idx="0">
-              <a:schemeClr val="accent1"/>
-            </a:fillRef>
-            <a:effectRef idx="0">
-              <a:schemeClr val="accent1"/>
-            </a:effectRef>
-            <a:fontRef idx="minor">
-              <a:schemeClr val="tx1"/>
-            </a:fontRef>
-          </p:style>
-        </p:cxnSp>
-        <p:sp>
-          <p:nvSpPr>
-            <p:cNvPr id="35" name="TextBox 34"/>
-            <p:cNvSpPr txBox="1"/>
-            <p:nvPr/>
-          </p:nvSpPr>
-          <p:spPr>
-            <a:xfrm>
-              <a:off x="4266127" y="2202288"/>
-              <a:ext cx="734096" cy="463639"/>
-            </a:xfrm>
-            <a:prstGeom prst="rect">
-              <a:avLst/>
-            </a:prstGeom>
-            <a:noFill/>
-          </p:spPr>
-          <p:txBody>
-            <a:bodyPr wrap="square" rtlCol="0">
-              <a:spAutoFit/>
-            </a:bodyPr>
-            <a:lstStyle/>
-            <a:p>
-              <a:pPr algn="ctr"/>
-              <a:r>
-                <a:rPr lang="en-US" sz="1200" dirty="0" smtClean="0"/>
-                <a:t>pressure values</a:t>
-              </a:r>
-              <a:endParaRPr lang="en-US" sz="1200" dirty="0"/>
-            </a:p>
-          </p:txBody>
-        </p:sp>
-        <p:sp>
-          <p:nvSpPr>
-            <p:cNvPr id="36" name="TextBox 35"/>
-            <p:cNvSpPr txBox="1"/>
-            <p:nvPr/>
-          </p:nvSpPr>
-          <p:spPr>
-            <a:xfrm>
-              <a:off x="5651678" y="2215168"/>
-              <a:ext cx="991673" cy="461665"/>
-            </a:xfrm>
-            <a:prstGeom prst="rect">
-              <a:avLst/>
-            </a:prstGeom>
-            <a:noFill/>
-          </p:spPr>
-          <p:txBody>
-            <a:bodyPr wrap="square" rtlCol="0">
-              <a:spAutoFit/>
-            </a:bodyPr>
-            <a:lstStyle/>
-            <a:p>
-              <a:pPr algn="ctr"/>
-              <a:r>
-                <a:rPr lang="en-US" sz="1200" dirty="0" smtClean="0"/>
-                <a:t>window </a:t>
-              </a:r>
-              <a:r>
-                <a:rPr lang="en-US" sz="1200" dirty="0"/>
-                <a:t>values</a:t>
-              </a:r>
-            </a:p>
-          </p:txBody>
-        </p:sp>
-        <p:sp>
-          <p:nvSpPr>
-            <p:cNvPr id="37" name="TextBox 36"/>
-            <p:cNvSpPr txBox="1"/>
-            <p:nvPr/>
-          </p:nvSpPr>
-          <p:spPr>
-            <a:xfrm>
-              <a:off x="7479406" y="2215168"/>
-              <a:ext cx="991673" cy="461665"/>
-            </a:xfrm>
-            <a:prstGeom prst="rect">
-              <a:avLst/>
-            </a:prstGeom>
-            <a:noFill/>
-          </p:spPr>
-          <p:txBody>
-            <a:bodyPr wrap="square" rtlCol="0">
-              <a:spAutoFit/>
-            </a:bodyPr>
-            <a:lstStyle/>
-            <a:p>
-              <a:pPr algn="ctr"/>
-              <a:r>
-                <a:rPr lang="en-US" sz="1200" dirty="0" smtClean="0"/>
-                <a:t>window </a:t>
-              </a:r>
-              <a:r>
-                <a:rPr lang="en-US" sz="1200" dirty="0"/>
-                <a:t>features</a:t>
-              </a:r>
-            </a:p>
-          </p:txBody>
-        </p:sp>
-        <p:cxnSp>
-          <p:nvCxnSpPr>
-            <p:cNvPr id="39" name="Straight Arrow Connector 38"/>
-            <p:cNvCxnSpPr>
-              <a:stCxn id="4" idx="3"/>
-              <a:endCxn id="6" idx="1"/>
-            </p:cNvCxnSpPr>
-            <p:nvPr/>
-          </p:nvCxnSpPr>
-          <p:spPr>
-            <a:xfrm>
-              <a:off x="4340180" y="2440547"/>
-              <a:ext cx="611749" cy="0"/>
-            </a:xfrm>
-            <a:prstGeom prst="straightConnector1">
-              <a:avLst/>
-            </a:prstGeom>
-            <a:ln>
-              <a:tailEnd type="triangle"/>
-            </a:ln>
-          </p:spPr>
-          <p:style>
-            <a:lnRef idx="1">
-              <a:schemeClr val="accent1"/>
-            </a:lnRef>
-            <a:fillRef idx="0">
-              <a:schemeClr val="accent1"/>
-            </a:fillRef>
-            <a:effectRef idx="0">
-              <a:schemeClr val="accent1"/>
-            </a:effectRef>
-            <a:fontRef idx="minor">
-              <a:schemeClr val="tx1"/>
-            </a:fontRef>
-          </p:style>
-        </p:cxnSp>
-        <p:cxnSp>
-          <p:nvCxnSpPr>
-            <p:cNvPr id="40" name="Straight Arrow Connector 39"/>
-            <p:cNvCxnSpPr/>
-            <p:nvPr/>
-          </p:nvCxnSpPr>
-          <p:spPr>
-            <a:xfrm>
-              <a:off x="5870621" y="2440547"/>
-              <a:ext cx="624628" cy="0"/>
-            </a:xfrm>
-            <a:prstGeom prst="straightConnector1">
-              <a:avLst/>
-            </a:prstGeom>
-            <a:ln>
-              <a:tailEnd type="triangle"/>
-            </a:ln>
-          </p:spPr>
-          <p:style>
-            <a:lnRef idx="1">
-              <a:schemeClr val="accent1"/>
-            </a:lnRef>
-            <a:fillRef idx="0">
-              <a:schemeClr val="accent1"/>
-            </a:fillRef>
-            <a:effectRef idx="0">
-              <a:schemeClr val="accent1"/>
-            </a:effectRef>
-            <a:fontRef idx="minor">
-              <a:schemeClr val="tx1"/>
-            </a:fontRef>
-          </p:style>
-        </p:cxnSp>
-        <p:cxnSp>
-          <p:nvCxnSpPr>
-            <p:cNvPr id="41" name="Straight Arrow Connector 40"/>
-            <p:cNvCxnSpPr/>
-            <p:nvPr/>
-          </p:nvCxnSpPr>
-          <p:spPr>
-            <a:xfrm>
-              <a:off x="7624294" y="2440547"/>
-              <a:ext cx="701902" cy="0"/>
-            </a:xfrm>
-            <a:prstGeom prst="straightConnector1">
-              <a:avLst/>
-            </a:prstGeom>
-            <a:ln>
-              <a:tailEnd type="triangle"/>
-            </a:ln>
-          </p:spPr>
-          <p:style>
-            <a:lnRef idx="1">
-              <a:schemeClr val="accent1"/>
-            </a:lnRef>
-            <a:fillRef idx="0">
-              <a:schemeClr val="accent1"/>
-            </a:fillRef>
-            <a:effectRef idx="0">
-              <a:schemeClr val="accent1"/>
-            </a:effectRef>
-            <a:fontRef idx="minor">
-              <a:schemeClr val="tx1"/>
-            </a:fontRef>
-          </p:style>
-        </p:cxnSp>
-        <p:sp>
-          <p:nvSpPr>
-            <p:cNvPr id="44" name="TextBox 43"/>
-            <p:cNvSpPr txBox="1"/>
-            <p:nvPr/>
-          </p:nvSpPr>
-          <p:spPr>
-            <a:xfrm>
-              <a:off x="8252142" y="2688622"/>
-              <a:ext cx="991673" cy="276999"/>
-            </a:xfrm>
-            <a:prstGeom prst="rect">
-              <a:avLst/>
-            </a:prstGeom>
-            <a:noFill/>
-          </p:spPr>
-          <p:txBody>
-            <a:bodyPr wrap="square" rtlCol="0">
-              <a:spAutoFit/>
-            </a:bodyPr>
-            <a:lstStyle/>
-            <a:p>
-              <a:pPr algn="ctr"/>
-              <a:r>
-                <a:rPr lang="en-US" sz="1200" dirty="0" smtClean="0"/>
-                <a:t>save</a:t>
-              </a:r>
-              <a:endParaRPr lang="en-US" sz="1200" dirty="0"/>
-            </a:p>
-          </p:txBody>
-        </p:sp>
-        <p:sp>
-          <p:nvSpPr>
-            <p:cNvPr id="48" name="Rectangle 47"/>
-            <p:cNvSpPr/>
-            <p:nvPr/>
-          </p:nvSpPr>
-          <p:spPr>
-            <a:xfrm>
-              <a:off x="3271234" y="3818781"/>
-              <a:ext cx="1081825" cy="450760"/>
-            </a:xfrm>
-            <a:prstGeom prst="rect">
-              <a:avLst/>
-            </a:prstGeom>
-            <a:noFill/>
-          </p:spPr>
-          <p:style>
-            <a:lnRef idx="2">
-              <a:schemeClr val="accent1">
-                <a:shade val="50000"/>
-              </a:schemeClr>
-            </a:lnRef>
-            <a:fillRef idx="1">
-              <a:schemeClr val="accent1"/>
-            </a:fillRef>
-            <a:effectRef idx="0">
-              <a:schemeClr val="accent1"/>
-            </a:effectRef>
-            <a:fontRef idx="minor">
-              <a:schemeClr val="lt1"/>
-            </a:fontRef>
-          </p:style>
-          <p:txBody>
-            <a:bodyPr rtlCol="0" anchor="ctr"/>
-            <a:lstStyle/>
-            <a:p>
-              <a:pPr algn="ctr"/>
-              <a:r>
-                <a:rPr lang="en-US" sz="1200" b="1" dirty="0" smtClean="0">
-                  <a:solidFill>
-                    <a:schemeClr val="tx1"/>
-                  </a:solidFill>
-                </a:rPr>
-                <a:t>Preprocessing</a:t>
-              </a:r>
-              <a:endParaRPr lang="en-US" sz="1200" b="1" dirty="0">
+            </a:endParaRPr>
+          </a:p>
+        </p:txBody>
+      </p:sp>
+      <p:sp>
+        <p:nvSpPr>
+          <p:cNvPr id="49" name="Rectangle 48"/>
+          <p:cNvSpPr/>
+          <p:nvPr/>
+        </p:nvSpPr>
+        <p:spPr>
+          <a:xfrm>
+            <a:off x="4690480" y="3731615"/>
+            <a:ext cx="1061588" cy="450760"/>
+          </a:xfrm>
+          <a:prstGeom prst="rect">
+            <a:avLst/>
+          </a:prstGeom>
+          <a:noFill/>
+        </p:spPr>
+        <p:style>
+          <a:lnRef idx="2">
+            <a:schemeClr val="accent1">
+              <a:shade val="50000"/>
+            </a:schemeClr>
+          </a:lnRef>
+          <a:fillRef idx="1">
+            <a:schemeClr val="accent1"/>
+          </a:fillRef>
+          <a:effectRef idx="0">
+            <a:schemeClr val="accent1"/>
+          </a:effectRef>
+          <a:fontRef idx="minor">
+            <a:schemeClr val="lt1"/>
+          </a:fontRef>
+        </p:style>
+        <p:txBody>
+          <a:bodyPr rtlCol="0" anchor="ctr"/>
+          <a:lstStyle/>
+          <a:p>
+            <a:pPr algn="ctr"/>
+            <a:r>
+              <a:rPr lang="en-US" sz="1400" b="1" dirty="0" smtClean="0">
                 <a:solidFill>
                   <a:schemeClr val="tx1"/>
                 </a:solidFill>
-              </a:endParaRPr>
-            </a:p>
-          </p:txBody>
-        </p:sp>
-        <p:sp>
-          <p:nvSpPr>
-            <p:cNvPr id="49" name="Rectangle 48"/>
-            <p:cNvSpPr/>
-            <p:nvPr/>
-          </p:nvSpPr>
-          <p:spPr>
-            <a:xfrm>
-              <a:off x="4951929" y="3818781"/>
-              <a:ext cx="918692" cy="450760"/>
-            </a:xfrm>
-            <a:prstGeom prst="rect">
-              <a:avLst/>
-            </a:prstGeom>
-            <a:noFill/>
-          </p:spPr>
-          <p:style>
-            <a:lnRef idx="2">
-              <a:schemeClr val="accent1">
-                <a:shade val="50000"/>
-              </a:schemeClr>
-            </a:lnRef>
-            <a:fillRef idx="1">
-              <a:schemeClr val="accent1"/>
-            </a:fillRef>
-            <a:effectRef idx="0">
-              <a:schemeClr val="accent1"/>
-            </a:effectRef>
-            <a:fontRef idx="minor">
-              <a:schemeClr val="lt1"/>
-            </a:fontRef>
-          </p:style>
-          <p:txBody>
-            <a:bodyPr rtlCol="0" anchor="ctr"/>
-            <a:lstStyle/>
-            <a:p>
-              <a:pPr algn="ctr"/>
-              <a:r>
-                <a:rPr lang="en-US" sz="1200" b="1" dirty="0" smtClean="0">
-                  <a:solidFill>
-                    <a:schemeClr val="tx1"/>
-                  </a:solidFill>
-                </a:rPr>
-                <a:t>Windowing</a:t>
-              </a:r>
-              <a:endParaRPr lang="en-US" sz="1200" b="1" dirty="0">
+              </a:rPr>
+              <a:t>Windowing</a:t>
+            </a:r>
+            <a:endParaRPr lang="en-US" sz="1400" b="1" dirty="0">
+              <a:solidFill>
+                <a:schemeClr val="tx1"/>
+              </a:solidFill>
+            </a:endParaRPr>
+          </a:p>
+        </p:txBody>
+      </p:sp>
+      <p:sp>
+        <p:nvSpPr>
+          <p:cNvPr id="50" name="Rectangle 49"/>
+          <p:cNvSpPr/>
+          <p:nvPr/>
+        </p:nvSpPr>
+        <p:spPr>
+          <a:xfrm>
+            <a:off x="6233799" y="4154983"/>
+            <a:ext cx="1129046" cy="450760"/>
+          </a:xfrm>
+          <a:prstGeom prst="rect">
+            <a:avLst/>
+          </a:prstGeom>
+          <a:noFill/>
+        </p:spPr>
+        <p:style>
+          <a:lnRef idx="2">
+            <a:schemeClr val="accent1">
+              <a:shade val="50000"/>
+            </a:schemeClr>
+          </a:lnRef>
+          <a:fillRef idx="1">
+            <a:schemeClr val="accent1"/>
+          </a:fillRef>
+          <a:effectRef idx="0">
+            <a:schemeClr val="accent1"/>
+          </a:effectRef>
+          <a:fontRef idx="minor">
+            <a:schemeClr val="lt1"/>
+          </a:fontRef>
+        </p:style>
+        <p:txBody>
+          <a:bodyPr rtlCol="0" anchor="ctr"/>
+          <a:lstStyle/>
+          <a:p>
+            <a:pPr algn="ctr"/>
+            <a:r>
+              <a:rPr lang="en-US" sz="1400" b="1" dirty="0" smtClean="0">
                 <a:solidFill>
                   <a:schemeClr val="tx1"/>
                 </a:solidFill>
-              </a:endParaRPr>
-            </a:p>
-          </p:txBody>
-        </p:sp>
-        <p:sp>
-          <p:nvSpPr>
-            <p:cNvPr id="50" name="Rectangle 49"/>
-            <p:cNvSpPr/>
-            <p:nvPr/>
-          </p:nvSpPr>
-          <p:spPr>
-            <a:xfrm>
-              <a:off x="6495248" y="3818781"/>
-              <a:ext cx="1129046" cy="450760"/>
-            </a:xfrm>
-            <a:prstGeom prst="rect">
-              <a:avLst/>
-            </a:prstGeom>
-            <a:noFill/>
-          </p:spPr>
-          <p:style>
-            <a:lnRef idx="2">
-              <a:schemeClr val="accent1">
-                <a:shade val="50000"/>
-              </a:schemeClr>
-            </a:lnRef>
-            <a:fillRef idx="1">
-              <a:schemeClr val="accent1"/>
-            </a:fillRef>
-            <a:effectRef idx="0">
-              <a:schemeClr val="accent1"/>
-            </a:effectRef>
-            <a:fontRef idx="minor">
-              <a:schemeClr val="lt1"/>
-            </a:fontRef>
-          </p:style>
-          <p:txBody>
-            <a:bodyPr rtlCol="0" anchor="ctr"/>
-            <a:lstStyle/>
-            <a:p>
-              <a:pPr algn="ctr"/>
-              <a:r>
-                <a:rPr lang="en-US" sz="1200" b="1" dirty="0" smtClean="0">
-                  <a:solidFill>
-                    <a:schemeClr val="tx1"/>
-                  </a:solidFill>
-                </a:rPr>
-                <a:t>Feature Extraction</a:t>
-              </a:r>
-              <a:endParaRPr lang="en-US" sz="1200" b="1" dirty="0">
+              </a:rPr>
+              <a:t>Feature Extraction</a:t>
+            </a:r>
+            <a:endParaRPr lang="en-US" sz="1400" b="1" dirty="0">
+              <a:solidFill>
+                <a:schemeClr val="tx1"/>
+              </a:solidFill>
+            </a:endParaRPr>
+          </a:p>
+        </p:txBody>
+      </p:sp>
+      <p:sp>
+        <p:nvSpPr>
+          <p:cNvPr id="51" name="Rectangle 50"/>
+          <p:cNvSpPr/>
+          <p:nvPr/>
+        </p:nvSpPr>
+        <p:spPr>
+          <a:xfrm>
+            <a:off x="8104376" y="4154983"/>
+            <a:ext cx="1085408" cy="450760"/>
+          </a:xfrm>
+          <a:prstGeom prst="rect">
+            <a:avLst/>
+          </a:prstGeom>
+          <a:noFill/>
+        </p:spPr>
+        <p:style>
+          <a:lnRef idx="2">
+            <a:schemeClr val="accent1">
+              <a:shade val="50000"/>
+            </a:schemeClr>
+          </a:lnRef>
+          <a:fillRef idx="1">
+            <a:schemeClr val="accent1"/>
+          </a:fillRef>
+          <a:effectRef idx="0">
+            <a:schemeClr val="accent1"/>
+          </a:effectRef>
+          <a:fontRef idx="minor">
+            <a:schemeClr val="lt1"/>
+          </a:fontRef>
+        </p:style>
+        <p:txBody>
+          <a:bodyPr rtlCol="0" anchor="ctr"/>
+          <a:lstStyle/>
+          <a:p>
+            <a:pPr algn="ctr"/>
+            <a:r>
+              <a:rPr lang="en-US" sz="1400" b="1" dirty="0">
                 <a:solidFill>
                   <a:schemeClr val="tx1"/>
                 </a:solidFill>
-              </a:endParaRPr>
-            </a:p>
-          </p:txBody>
-        </p:sp>
-        <p:sp>
-          <p:nvSpPr>
-            <p:cNvPr id="51" name="Rectangle 50"/>
-            <p:cNvSpPr/>
-            <p:nvPr/>
-          </p:nvSpPr>
-          <p:spPr>
-            <a:xfrm>
-              <a:off x="8351945" y="3818781"/>
-              <a:ext cx="1010992" cy="450760"/>
-            </a:xfrm>
-            <a:prstGeom prst="rect">
-              <a:avLst/>
-            </a:prstGeom>
-            <a:noFill/>
-          </p:spPr>
-          <p:style>
-            <a:lnRef idx="2">
-              <a:schemeClr val="accent1">
-                <a:shade val="50000"/>
-              </a:schemeClr>
-            </a:lnRef>
-            <a:fillRef idx="1">
-              <a:schemeClr val="accent1"/>
-            </a:fillRef>
-            <a:effectRef idx="0">
-              <a:schemeClr val="accent1"/>
-            </a:effectRef>
-            <a:fontRef idx="minor">
-              <a:schemeClr val="lt1"/>
-            </a:fontRef>
-          </p:style>
-          <p:txBody>
-            <a:bodyPr rtlCol="0" anchor="ctr"/>
-            <a:lstStyle/>
-            <a:p>
-              <a:pPr algn="ctr"/>
-              <a:r>
-                <a:rPr lang="en-US" sz="1200" b="1" dirty="0">
-                  <a:solidFill>
-                    <a:schemeClr val="tx1"/>
-                  </a:solidFill>
-                </a:rPr>
-                <a:t>R</a:t>
-              </a:r>
-              <a:r>
-                <a:rPr lang="en-US" sz="1200" b="1" dirty="0" smtClean="0">
-                  <a:solidFill>
-                    <a:schemeClr val="tx1"/>
-                  </a:solidFill>
-                </a:rPr>
-                <a:t>ecognition</a:t>
-              </a:r>
-              <a:endParaRPr lang="en-US" sz="1200" b="1" dirty="0">
+              </a:rPr>
+              <a:t>R</a:t>
+            </a:r>
+            <a:r>
+              <a:rPr lang="en-US" sz="1400" b="1" dirty="0" smtClean="0">
                 <a:solidFill>
                   <a:schemeClr val="tx1"/>
                 </a:solidFill>
-              </a:endParaRPr>
-            </a:p>
-          </p:txBody>
-        </p:sp>
-        <p:sp>
-          <p:nvSpPr>
-            <p:cNvPr id="52" name="TextBox 51"/>
-            <p:cNvSpPr txBox="1"/>
-            <p:nvPr/>
-          </p:nvSpPr>
-          <p:spPr>
-            <a:xfrm>
-              <a:off x="4279006" y="3805902"/>
-              <a:ext cx="734096" cy="463639"/>
-            </a:xfrm>
-            <a:prstGeom prst="rect">
-              <a:avLst/>
-            </a:prstGeom>
-            <a:noFill/>
-          </p:spPr>
-          <p:txBody>
-            <a:bodyPr wrap="square" rtlCol="0">
-              <a:spAutoFit/>
-            </a:bodyPr>
-            <a:lstStyle/>
-            <a:p>
-              <a:pPr algn="ctr"/>
-              <a:r>
-                <a:rPr lang="en-US" sz="1200" dirty="0" smtClean="0"/>
-                <a:t>pressure values</a:t>
-              </a:r>
-              <a:endParaRPr lang="en-US" sz="1200" dirty="0"/>
-            </a:p>
-          </p:txBody>
-        </p:sp>
-        <p:sp>
-          <p:nvSpPr>
-            <p:cNvPr id="53" name="TextBox 52"/>
-            <p:cNvSpPr txBox="1"/>
-            <p:nvPr/>
-          </p:nvSpPr>
-          <p:spPr>
-            <a:xfrm>
-              <a:off x="5651678" y="3818782"/>
-              <a:ext cx="991673" cy="461665"/>
-            </a:xfrm>
-            <a:prstGeom prst="rect">
-              <a:avLst/>
-            </a:prstGeom>
-            <a:noFill/>
-          </p:spPr>
-          <p:txBody>
-            <a:bodyPr wrap="square" rtlCol="0">
-              <a:spAutoFit/>
-            </a:bodyPr>
-            <a:lstStyle/>
-            <a:p>
-              <a:pPr algn="ctr"/>
-              <a:r>
-                <a:rPr lang="en-US" sz="1200" dirty="0" smtClean="0"/>
-                <a:t>window </a:t>
-              </a:r>
-              <a:r>
-                <a:rPr lang="en-US" sz="1200" dirty="0"/>
-                <a:t>values</a:t>
-              </a:r>
-            </a:p>
-          </p:txBody>
-        </p:sp>
-        <p:sp>
-          <p:nvSpPr>
-            <p:cNvPr id="54" name="TextBox 53"/>
-            <p:cNvSpPr txBox="1"/>
-            <p:nvPr/>
-          </p:nvSpPr>
-          <p:spPr>
-            <a:xfrm>
-              <a:off x="7466527" y="3818782"/>
-              <a:ext cx="991673" cy="461665"/>
-            </a:xfrm>
-            <a:prstGeom prst="rect">
-              <a:avLst/>
-            </a:prstGeom>
-            <a:noFill/>
-          </p:spPr>
-          <p:txBody>
-            <a:bodyPr wrap="square" rtlCol="0">
-              <a:spAutoFit/>
-            </a:bodyPr>
-            <a:lstStyle/>
-            <a:p>
-              <a:pPr algn="ctr"/>
-              <a:r>
-                <a:rPr lang="en-US" sz="1200" dirty="0" smtClean="0"/>
-                <a:t>window </a:t>
-              </a:r>
-              <a:r>
-                <a:rPr lang="en-US" sz="1200" dirty="0"/>
-                <a:t>features</a:t>
-              </a:r>
-            </a:p>
-          </p:txBody>
-        </p:sp>
-        <p:cxnSp>
-          <p:nvCxnSpPr>
-            <p:cNvPr id="55" name="Straight Arrow Connector 54"/>
-            <p:cNvCxnSpPr>
-              <a:stCxn id="48" idx="3"/>
-              <a:endCxn id="49" idx="1"/>
-            </p:cNvCxnSpPr>
-            <p:nvPr/>
-          </p:nvCxnSpPr>
-          <p:spPr>
-            <a:xfrm>
-              <a:off x="4353059" y="4044161"/>
-              <a:ext cx="598870" cy="0"/>
-            </a:xfrm>
-            <a:prstGeom prst="straightConnector1">
-              <a:avLst/>
-            </a:prstGeom>
-            <a:ln>
-              <a:tailEnd type="triangle"/>
-            </a:ln>
-          </p:spPr>
-          <p:style>
-            <a:lnRef idx="1">
-              <a:schemeClr val="accent1"/>
-            </a:lnRef>
-            <a:fillRef idx="0">
-              <a:schemeClr val="accent1"/>
-            </a:fillRef>
-            <a:effectRef idx="0">
-              <a:schemeClr val="accent1"/>
-            </a:effectRef>
-            <a:fontRef idx="minor">
-              <a:schemeClr val="tx1"/>
-            </a:fontRef>
-          </p:style>
-        </p:cxnSp>
-        <p:cxnSp>
-          <p:nvCxnSpPr>
-            <p:cNvPr id="56" name="Straight Arrow Connector 55"/>
-            <p:cNvCxnSpPr/>
-            <p:nvPr/>
-          </p:nvCxnSpPr>
-          <p:spPr>
-            <a:xfrm>
-              <a:off x="5793347" y="4044161"/>
-              <a:ext cx="701902" cy="0"/>
-            </a:xfrm>
-            <a:prstGeom prst="straightConnector1">
-              <a:avLst/>
-            </a:prstGeom>
-            <a:ln>
-              <a:tailEnd type="triangle"/>
-            </a:ln>
-          </p:spPr>
-          <p:style>
-            <a:lnRef idx="1">
-              <a:schemeClr val="accent1"/>
-            </a:lnRef>
-            <a:fillRef idx="0">
-              <a:schemeClr val="accent1"/>
-            </a:fillRef>
-            <a:effectRef idx="0">
-              <a:schemeClr val="accent1"/>
-            </a:effectRef>
-            <a:fontRef idx="minor">
-              <a:schemeClr val="tx1"/>
-            </a:fontRef>
-          </p:style>
-        </p:cxnSp>
-        <p:cxnSp>
-          <p:nvCxnSpPr>
-            <p:cNvPr id="57" name="Straight Arrow Connector 56"/>
-            <p:cNvCxnSpPr/>
-            <p:nvPr/>
-          </p:nvCxnSpPr>
-          <p:spPr>
-            <a:xfrm>
-              <a:off x="7624294" y="4044161"/>
-              <a:ext cx="701902" cy="0"/>
-            </a:xfrm>
-            <a:prstGeom prst="straightConnector1">
-              <a:avLst/>
-            </a:prstGeom>
-            <a:ln>
-              <a:tailEnd type="triangle"/>
-            </a:ln>
-          </p:spPr>
-          <p:style>
-            <a:lnRef idx="1">
-              <a:schemeClr val="accent1"/>
-            </a:lnRef>
-            <a:fillRef idx="0">
-              <a:schemeClr val="accent1"/>
-            </a:fillRef>
-            <a:effectRef idx="0">
-              <a:schemeClr val="accent1"/>
-            </a:effectRef>
-            <a:fontRef idx="minor">
-              <a:schemeClr val="tx1"/>
-            </a:fontRef>
-          </p:style>
-        </p:cxnSp>
-        <p:sp>
-          <p:nvSpPr>
-            <p:cNvPr id="58" name="TextBox 57"/>
-            <p:cNvSpPr txBox="1"/>
-            <p:nvPr/>
-          </p:nvSpPr>
-          <p:spPr>
-            <a:xfrm>
-              <a:off x="8261801" y="3503057"/>
-              <a:ext cx="991673" cy="276999"/>
-            </a:xfrm>
-            <a:prstGeom prst="rect">
-              <a:avLst/>
-            </a:prstGeom>
-            <a:noFill/>
-          </p:spPr>
-          <p:txBody>
-            <a:bodyPr wrap="square" rtlCol="0">
-              <a:spAutoFit/>
-            </a:bodyPr>
-            <a:lstStyle/>
-            <a:p>
-              <a:pPr algn="ctr"/>
-              <a:r>
-                <a:rPr lang="en-US" sz="1200" dirty="0" smtClean="0"/>
-                <a:t>load</a:t>
-              </a:r>
-              <a:endParaRPr lang="en-US" sz="1200" dirty="0"/>
-            </a:p>
-          </p:txBody>
-        </p:sp>
-        <p:pic>
-          <p:nvPicPr>
-            <p:cNvPr id="59" name="Picture 58"/>
-            <p:cNvPicPr>
-              <a:picLocks noChangeAspect="1"/>
-            </p:cNvPicPr>
-            <p:nvPr/>
-          </p:nvPicPr>
-          <p:blipFill>
-            <a:blip r:embed="rId2"/>
-            <a:stretch>
-              <a:fillRect/>
-            </a:stretch>
-          </p:blipFill>
-          <p:spPr>
-            <a:xfrm>
-              <a:off x="1543663" y="2530504"/>
-              <a:ext cx="543830" cy="565157"/>
-            </a:xfrm>
-            <a:prstGeom prst="rect">
-              <a:avLst/>
-            </a:prstGeom>
-          </p:spPr>
-        </p:pic>
-        <p:pic>
-          <p:nvPicPr>
-            <p:cNvPr id="60" name="Picture 59"/>
-            <p:cNvPicPr>
-              <a:picLocks noChangeAspect="1"/>
-            </p:cNvPicPr>
-            <p:nvPr/>
-          </p:nvPicPr>
-          <p:blipFill>
-            <a:blip r:embed="rId2"/>
-            <a:stretch>
-              <a:fillRect/>
-            </a:stretch>
-          </p:blipFill>
-          <p:spPr>
-            <a:xfrm>
-              <a:off x="1553666" y="3358977"/>
-              <a:ext cx="543830" cy="565157"/>
-            </a:xfrm>
-            <a:prstGeom prst="rect">
-              <a:avLst/>
-            </a:prstGeom>
-          </p:spPr>
-        </p:pic>
-        <p:pic>
-          <p:nvPicPr>
-            <p:cNvPr id="1024" name="Picture 1023"/>
-            <p:cNvPicPr>
-              <a:picLocks noChangeAspect="1"/>
-            </p:cNvPicPr>
-            <p:nvPr/>
-          </p:nvPicPr>
-          <p:blipFill>
-            <a:blip r:embed="rId3">
-              <a:extLst>
-                <a:ext uri="{28A0092B-C50C-407E-A947-70E740481C1C}">
-                  <a14:useLocalDpi xmlns:a14="http://schemas.microsoft.com/office/drawing/2010/main" val="0"/>
-                </a:ext>
-              </a:extLst>
-            </a:blip>
-            <a:stretch>
-              <a:fillRect/>
-            </a:stretch>
-          </p:blipFill>
-          <p:spPr>
-            <a:xfrm>
-              <a:off x="2400836" y="2541332"/>
-              <a:ext cx="638264" cy="285790"/>
-            </a:xfrm>
-            <a:prstGeom prst="rect">
-              <a:avLst/>
-            </a:prstGeom>
-          </p:spPr>
-        </p:pic>
-        <p:pic>
-          <p:nvPicPr>
-            <p:cNvPr id="66" name="Picture 65"/>
-            <p:cNvPicPr>
-              <a:picLocks noChangeAspect="1"/>
-            </p:cNvPicPr>
-            <p:nvPr/>
-          </p:nvPicPr>
-          <p:blipFill>
-            <a:blip r:embed="rId3">
-              <a:extLst>
-                <a:ext uri="{28A0092B-C50C-407E-A947-70E740481C1C}">
-                  <a14:useLocalDpi xmlns:a14="http://schemas.microsoft.com/office/drawing/2010/main" val="0"/>
-                </a:ext>
-              </a:extLst>
-            </a:blip>
-            <a:stretch>
-              <a:fillRect/>
-            </a:stretch>
-          </p:blipFill>
-          <p:spPr>
-            <a:xfrm>
-              <a:off x="2365233" y="3810545"/>
-              <a:ext cx="638264" cy="285790"/>
-            </a:xfrm>
-            <a:prstGeom prst="rect">
-              <a:avLst/>
-            </a:prstGeom>
-          </p:spPr>
-        </p:pic>
-        <p:cxnSp>
-          <p:nvCxnSpPr>
-            <p:cNvPr id="1026" name="Straight Arrow Connector 1025"/>
-            <p:cNvCxnSpPr>
-              <a:stCxn id="59" idx="3"/>
-              <a:endCxn id="1024" idx="1"/>
-            </p:cNvCxnSpPr>
-            <p:nvPr/>
-          </p:nvCxnSpPr>
-          <p:spPr>
-            <a:xfrm flipV="1">
-              <a:off x="2087493" y="2684227"/>
-              <a:ext cx="313343" cy="128856"/>
-            </a:xfrm>
-            <a:prstGeom prst="straightConnector1">
-              <a:avLst/>
-            </a:prstGeom>
-            <a:ln>
-              <a:tailEnd type="triangle"/>
-            </a:ln>
-          </p:spPr>
-          <p:style>
-            <a:lnRef idx="1">
-              <a:schemeClr val="accent1"/>
-            </a:lnRef>
-            <a:fillRef idx="0">
-              <a:schemeClr val="accent1"/>
-            </a:fillRef>
-            <a:effectRef idx="0">
-              <a:schemeClr val="accent1"/>
-            </a:effectRef>
-            <a:fontRef idx="minor">
-              <a:schemeClr val="tx1"/>
-            </a:fontRef>
-          </p:style>
-        </p:cxnSp>
-        <p:cxnSp>
-          <p:nvCxnSpPr>
-            <p:cNvPr id="71" name="Straight Arrow Connector 70"/>
-            <p:cNvCxnSpPr>
-              <a:endCxn id="66" idx="1"/>
-            </p:cNvCxnSpPr>
-            <p:nvPr/>
-          </p:nvCxnSpPr>
-          <p:spPr>
-            <a:xfrm>
-              <a:off x="2087492" y="3674020"/>
-              <a:ext cx="277741" cy="279420"/>
-            </a:xfrm>
-            <a:prstGeom prst="straightConnector1">
-              <a:avLst/>
-            </a:prstGeom>
-            <a:ln>
-              <a:tailEnd type="triangle"/>
-            </a:ln>
-          </p:spPr>
-          <p:style>
-            <a:lnRef idx="1">
-              <a:schemeClr val="accent1"/>
-            </a:lnRef>
-            <a:fillRef idx="0">
-              <a:schemeClr val="accent1"/>
-            </a:fillRef>
-            <a:effectRef idx="0">
-              <a:schemeClr val="accent1"/>
-            </a:effectRef>
-            <a:fontRef idx="minor">
-              <a:schemeClr val="tx1"/>
-            </a:fontRef>
-          </p:style>
-        </p:cxnSp>
-        <p:cxnSp>
-          <p:nvCxnSpPr>
-            <p:cNvPr id="73" name="Straight Arrow Connector 72"/>
-            <p:cNvCxnSpPr>
-              <a:stCxn id="1024" idx="3"/>
-              <a:endCxn id="4" idx="1"/>
-            </p:cNvCxnSpPr>
-            <p:nvPr/>
-          </p:nvCxnSpPr>
-          <p:spPr>
-            <a:xfrm flipV="1">
-              <a:off x="3039100" y="2440547"/>
-              <a:ext cx="232134" cy="243680"/>
-            </a:xfrm>
-            <a:prstGeom prst="straightConnector1">
-              <a:avLst/>
-            </a:prstGeom>
-            <a:ln>
-              <a:tailEnd type="triangle"/>
-            </a:ln>
-          </p:spPr>
-          <p:style>
-            <a:lnRef idx="1">
-              <a:schemeClr val="accent1"/>
-            </a:lnRef>
-            <a:fillRef idx="0">
-              <a:schemeClr val="accent1"/>
-            </a:fillRef>
-            <a:effectRef idx="0">
-              <a:schemeClr val="accent1"/>
-            </a:effectRef>
-            <a:fontRef idx="minor">
-              <a:schemeClr val="tx1"/>
-            </a:fontRef>
-          </p:style>
-        </p:cxnSp>
-        <p:cxnSp>
-          <p:nvCxnSpPr>
-            <p:cNvPr id="75" name="Straight Arrow Connector 74"/>
-            <p:cNvCxnSpPr>
-              <a:endCxn id="48" idx="1"/>
-            </p:cNvCxnSpPr>
-            <p:nvPr/>
-          </p:nvCxnSpPr>
-          <p:spPr>
-            <a:xfrm>
-              <a:off x="2998259" y="3943804"/>
-              <a:ext cx="272975" cy="100357"/>
-            </a:xfrm>
-            <a:prstGeom prst="straightConnector1">
-              <a:avLst/>
-            </a:prstGeom>
-            <a:ln>
-              <a:tailEnd type="triangle"/>
-            </a:ln>
-          </p:spPr>
-          <p:style>
-            <a:lnRef idx="1">
-              <a:schemeClr val="accent1"/>
-            </a:lnRef>
-            <a:fillRef idx="0">
-              <a:schemeClr val="accent1"/>
-            </a:fillRef>
-            <a:effectRef idx="0">
-              <a:schemeClr val="accent1"/>
-            </a:effectRef>
-            <a:fontRef idx="minor">
-              <a:schemeClr val="tx1"/>
-            </a:fontRef>
-          </p:style>
-        </p:cxnSp>
-      </p:grpSp>
+              </a:rPr>
+              <a:t>ecognition</a:t>
+            </a:r>
+            <a:endParaRPr lang="en-US" sz="1400" b="1" dirty="0">
+              <a:solidFill>
+                <a:schemeClr val="tx1"/>
+              </a:solidFill>
+            </a:endParaRPr>
+          </a:p>
+        </p:txBody>
+      </p:sp>
+      <p:sp>
+        <p:nvSpPr>
+          <p:cNvPr id="52" name="TextBox 51"/>
+          <p:cNvSpPr txBox="1"/>
+          <p:nvPr/>
+        </p:nvSpPr>
+        <p:spPr>
+          <a:xfrm>
+            <a:off x="4316357" y="4142104"/>
+            <a:ext cx="734096" cy="463639"/>
+          </a:xfrm>
+          <a:prstGeom prst="rect">
+            <a:avLst/>
+          </a:prstGeom>
+          <a:noFill/>
+        </p:spPr>
+        <p:txBody>
+          <a:bodyPr wrap="square" rtlCol="0">
+            <a:spAutoFit/>
+          </a:bodyPr>
+          <a:lstStyle/>
+          <a:p>
+            <a:pPr algn="ctr"/>
+            <a:r>
+              <a:rPr lang="en-US" sz="1200" dirty="0" smtClean="0"/>
+              <a:t>pressure values</a:t>
+            </a:r>
+            <a:endParaRPr lang="en-US" sz="1200" dirty="0"/>
+          </a:p>
+        </p:txBody>
+      </p:sp>
+      <p:sp>
+        <p:nvSpPr>
+          <p:cNvPr id="53" name="TextBox 52"/>
+          <p:cNvSpPr txBox="1"/>
+          <p:nvPr/>
+        </p:nvSpPr>
+        <p:spPr>
+          <a:xfrm>
+            <a:off x="5390229" y="4154984"/>
+            <a:ext cx="991673" cy="461665"/>
+          </a:xfrm>
+          <a:prstGeom prst="rect">
+            <a:avLst/>
+          </a:prstGeom>
+          <a:noFill/>
+        </p:spPr>
+        <p:txBody>
+          <a:bodyPr wrap="square" rtlCol="0">
+            <a:spAutoFit/>
+          </a:bodyPr>
+          <a:lstStyle/>
+          <a:p>
+            <a:pPr algn="ctr"/>
+            <a:r>
+              <a:rPr lang="en-US" sz="1200" dirty="0" smtClean="0"/>
+              <a:t>window </a:t>
+            </a:r>
+            <a:r>
+              <a:rPr lang="en-US" sz="1200" dirty="0"/>
+              <a:t>values</a:t>
+            </a:r>
+          </a:p>
+        </p:txBody>
+      </p:sp>
+      <p:sp>
+        <p:nvSpPr>
+          <p:cNvPr id="54" name="TextBox 53"/>
+          <p:cNvSpPr txBox="1"/>
+          <p:nvPr/>
+        </p:nvSpPr>
+        <p:spPr>
+          <a:xfrm>
+            <a:off x="7205078" y="4154984"/>
+            <a:ext cx="991673" cy="461665"/>
+          </a:xfrm>
+          <a:prstGeom prst="rect">
+            <a:avLst/>
+          </a:prstGeom>
+          <a:noFill/>
+        </p:spPr>
+        <p:txBody>
+          <a:bodyPr wrap="square" rtlCol="0">
+            <a:spAutoFit/>
+          </a:bodyPr>
+          <a:lstStyle/>
+          <a:p>
+            <a:pPr algn="ctr"/>
+            <a:r>
+              <a:rPr lang="en-US" sz="1200" dirty="0" smtClean="0"/>
+              <a:t>window </a:t>
+            </a:r>
+            <a:r>
+              <a:rPr lang="en-US" sz="1200" dirty="0"/>
+              <a:t>features</a:t>
+            </a:r>
+          </a:p>
+        </p:txBody>
+      </p:sp>
+      <p:cxnSp>
+        <p:nvCxnSpPr>
+          <p:cNvPr id="55" name="Straight Arrow Connector 54"/>
+          <p:cNvCxnSpPr>
+            <a:stCxn id="48" idx="3"/>
+            <a:endCxn id="49" idx="1"/>
+          </p:cNvCxnSpPr>
+          <p:nvPr/>
+        </p:nvCxnSpPr>
+        <p:spPr>
+          <a:xfrm flipV="1">
+            <a:off x="4390410" y="3956995"/>
+            <a:ext cx="300070" cy="423368"/>
+          </a:xfrm>
+          <a:prstGeom prst="straightConnector1">
+            <a:avLst/>
+          </a:prstGeom>
+          <a:ln>
+            <a:tailEnd type="triangle"/>
+          </a:ln>
+        </p:spPr>
+        <p:style>
+          <a:lnRef idx="1">
+            <a:schemeClr val="accent1"/>
+          </a:lnRef>
+          <a:fillRef idx="0">
+            <a:schemeClr val="accent1"/>
+          </a:fillRef>
+          <a:effectRef idx="0">
+            <a:schemeClr val="accent1"/>
+          </a:effectRef>
+          <a:fontRef idx="minor">
+            <a:schemeClr val="tx1"/>
+          </a:fontRef>
+        </p:style>
+      </p:cxnSp>
+      <p:cxnSp>
+        <p:nvCxnSpPr>
+          <p:cNvPr id="56" name="Straight Arrow Connector 55"/>
+          <p:cNvCxnSpPr>
+            <a:stCxn id="49" idx="3"/>
+          </p:cNvCxnSpPr>
+          <p:nvPr/>
+        </p:nvCxnSpPr>
+        <p:spPr>
+          <a:xfrm>
+            <a:off x="5752068" y="3956995"/>
+            <a:ext cx="481732" cy="423368"/>
+          </a:xfrm>
+          <a:prstGeom prst="straightConnector1">
+            <a:avLst/>
+          </a:prstGeom>
+          <a:ln>
+            <a:tailEnd type="triangle"/>
+          </a:ln>
+        </p:spPr>
+        <p:style>
+          <a:lnRef idx="1">
+            <a:schemeClr val="accent1"/>
+          </a:lnRef>
+          <a:fillRef idx="0">
+            <a:schemeClr val="accent1"/>
+          </a:fillRef>
+          <a:effectRef idx="0">
+            <a:schemeClr val="accent1"/>
+          </a:effectRef>
+          <a:fontRef idx="minor">
+            <a:schemeClr val="tx1"/>
+          </a:fontRef>
+        </p:style>
+      </p:cxnSp>
+      <p:cxnSp>
+        <p:nvCxnSpPr>
+          <p:cNvPr id="57" name="Straight Arrow Connector 56"/>
+          <p:cNvCxnSpPr/>
+          <p:nvPr/>
+        </p:nvCxnSpPr>
+        <p:spPr>
+          <a:xfrm>
+            <a:off x="7363434" y="4371910"/>
+            <a:ext cx="812497" cy="13907"/>
+          </a:xfrm>
+          <a:prstGeom prst="straightConnector1">
+            <a:avLst/>
+          </a:prstGeom>
+          <a:ln>
+            <a:tailEnd type="triangle"/>
+          </a:ln>
+        </p:spPr>
+        <p:style>
+          <a:lnRef idx="1">
+            <a:schemeClr val="accent1"/>
+          </a:lnRef>
+          <a:fillRef idx="0">
+            <a:schemeClr val="accent1"/>
+          </a:fillRef>
+          <a:effectRef idx="0">
+            <a:schemeClr val="accent1"/>
+          </a:effectRef>
+          <a:fontRef idx="minor">
+            <a:schemeClr val="tx1"/>
+          </a:fontRef>
+        </p:style>
+      </p:cxnSp>
+      <p:sp>
+        <p:nvSpPr>
+          <p:cNvPr id="58" name="TextBox 57"/>
+          <p:cNvSpPr txBox="1"/>
+          <p:nvPr/>
+        </p:nvSpPr>
+        <p:spPr>
+          <a:xfrm>
+            <a:off x="7951772" y="3742099"/>
+            <a:ext cx="991673" cy="276999"/>
+          </a:xfrm>
+          <a:prstGeom prst="rect">
+            <a:avLst/>
+          </a:prstGeom>
+          <a:noFill/>
+        </p:spPr>
+        <p:txBody>
+          <a:bodyPr wrap="square" rtlCol="0">
+            <a:spAutoFit/>
+          </a:bodyPr>
+          <a:lstStyle/>
+          <a:p>
+            <a:pPr algn="ctr"/>
+            <a:r>
+              <a:rPr lang="en-US" sz="1200" dirty="0" smtClean="0"/>
+              <a:t>load</a:t>
+            </a:r>
+            <a:endParaRPr lang="en-US" sz="1200" dirty="0"/>
+          </a:p>
+        </p:txBody>
+      </p:sp>
+      <p:pic>
+        <p:nvPicPr>
+          <p:cNvPr id="59" name="Picture 58"/>
+          <p:cNvPicPr>
+            <a:picLocks noChangeAspect="1"/>
+          </p:cNvPicPr>
+          <p:nvPr/>
+        </p:nvPicPr>
+        <p:blipFill>
+          <a:blip r:embed="rId2"/>
+          <a:stretch>
+            <a:fillRect/>
+          </a:stretch>
+        </p:blipFill>
+        <p:spPr>
+          <a:xfrm>
+            <a:off x="1581014" y="2381078"/>
+            <a:ext cx="543830" cy="565157"/>
+          </a:xfrm>
+          <a:prstGeom prst="rect">
+            <a:avLst/>
+          </a:prstGeom>
+        </p:spPr>
+      </p:pic>
+      <p:pic>
+        <p:nvPicPr>
+          <p:cNvPr id="60" name="Picture 59"/>
+          <p:cNvPicPr>
+            <a:picLocks noChangeAspect="1"/>
+          </p:cNvPicPr>
+          <p:nvPr/>
+        </p:nvPicPr>
+        <p:blipFill>
+          <a:blip r:embed="rId2"/>
+          <a:stretch>
+            <a:fillRect/>
+          </a:stretch>
+        </p:blipFill>
+        <p:spPr>
+          <a:xfrm>
+            <a:off x="1591017" y="3695179"/>
+            <a:ext cx="543830" cy="565157"/>
+          </a:xfrm>
+          <a:prstGeom prst="rect">
+            <a:avLst/>
+          </a:prstGeom>
+        </p:spPr>
+      </p:pic>
+      <p:pic>
+        <p:nvPicPr>
+          <p:cNvPr id="1024" name="Picture 1023"/>
+          <p:cNvPicPr>
+            <a:picLocks noChangeAspect="1"/>
+          </p:cNvPicPr>
+          <p:nvPr/>
+        </p:nvPicPr>
+        <p:blipFill>
+          <a:blip r:embed="rId3">
+            <a:extLst>
+              <a:ext uri="{28A0092B-C50C-407E-A947-70E740481C1C}">
+                <a14:useLocalDpi xmlns:a14="http://schemas.microsoft.com/office/drawing/2010/main" val="0"/>
+              </a:ext>
+            </a:extLst>
+          </a:blip>
+          <a:stretch>
+            <a:fillRect/>
+          </a:stretch>
+        </p:blipFill>
+        <p:spPr>
+          <a:xfrm>
+            <a:off x="2438187" y="2391906"/>
+            <a:ext cx="638264" cy="285790"/>
+          </a:xfrm>
+          <a:prstGeom prst="rect">
+            <a:avLst/>
+          </a:prstGeom>
+        </p:spPr>
+      </p:pic>
+      <p:pic>
+        <p:nvPicPr>
+          <p:cNvPr id="66" name="Picture 65"/>
+          <p:cNvPicPr>
+            <a:picLocks noChangeAspect="1"/>
+          </p:cNvPicPr>
+          <p:nvPr/>
+        </p:nvPicPr>
+        <p:blipFill>
+          <a:blip r:embed="rId3">
+            <a:extLst>
+              <a:ext uri="{28A0092B-C50C-407E-A947-70E740481C1C}">
+                <a14:useLocalDpi xmlns:a14="http://schemas.microsoft.com/office/drawing/2010/main" val="0"/>
+              </a:ext>
+            </a:extLst>
+          </a:blip>
+          <a:stretch>
+            <a:fillRect/>
+          </a:stretch>
+        </p:blipFill>
+        <p:spPr>
+          <a:xfrm>
+            <a:off x="2402584" y="4146747"/>
+            <a:ext cx="638264" cy="285790"/>
+          </a:xfrm>
+          <a:prstGeom prst="rect">
+            <a:avLst/>
+          </a:prstGeom>
+        </p:spPr>
+      </p:pic>
+      <p:cxnSp>
+        <p:nvCxnSpPr>
+          <p:cNvPr id="1026" name="Straight Arrow Connector 1025"/>
+          <p:cNvCxnSpPr>
+            <a:stCxn id="59" idx="3"/>
+            <a:endCxn id="1024" idx="1"/>
+          </p:cNvCxnSpPr>
+          <p:nvPr/>
+        </p:nvCxnSpPr>
+        <p:spPr>
+          <a:xfrm flipV="1">
+            <a:off x="2124844" y="2534801"/>
+            <a:ext cx="313343" cy="128856"/>
+          </a:xfrm>
+          <a:prstGeom prst="straightConnector1">
+            <a:avLst/>
+          </a:prstGeom>
+          <a:ln>
+            <a:tailEnd type="triangle"/>
+          </a:ln>
+        </p:spPr>
+        <p:style>
+          <a:lnRef idx="1">
+            <a:schemeClr val="accent1"/>
+          </a:lnRef>
+          <a:fillRef idx="0">
+            <a:schemeClr val="accent1"/>
+          </a:fillRef>
+          <a:effectRef idx="0">
+            <a:schemeClr val="accent1"/>
+          </a:effectRef>
+          <a:fontRef idx="minor">
+            <a:schemeClr val="tx1"/>
+          </a:fontRef>
+        </p:style>
+      </p:cxnSp>
+      <p:cxnSp>
+        <p:nvCxnSpPr>
+          <p:cNvPr id="71" name="Straight Arrow Connector 70"/>
+          <p:cNvCxnSpPr>
+            <a:endCxn id="66" idx="1"/>
+          </p:cNvCxnSpPr>
+          <p:nvPr/>
+        </p:nvCxnSpPr>
+        <p:spPr>
+          <a:xfrm>
+            <a:off x="2124843" y="4010222"/>
+            <a:ext cx="277741" cy="279420"/>
+          </a:xfrm>
+          <a:prstGeom prst="straightConnector1">
+            <a:avLst/>
+          </a:prstGeom>
+          <a:ln>
+            <a:tailEnd type="triangle"/>
+          </a:ln>
+        </p:spPr>
+        <p:style>
+          <a:lnRef idx="1">
+            <a:schemeClr val="accent1"/>
+          </a:lnRef>
+          <a:fillRef idx="0">
+            <a:schemeClr val="accent1"/>
+          </a:fillRef>
+          <a:effectRef idx="0">
+            <a:schemeClr val="accent1"/>
+          </a:effectRef>
+          <a:fontRef idx="minor">
+            <a:schemeClr val="tx1"/>
+          </a:fontRef>
+        </p:style>
+      </p:cxnSp>
+      <p:cxnSp>
+        <p:nvCxnSpPr>
+          <p:cNvPr id="73" name="Straight Arrow Connector 72"/>
+          <p:cNvCxnSpPr>
+            <a:stCxn id="1024" idx="3"/>
+            <a:endCxn id="4" idx="1"/>
+          </p:cNvCxnSpPr>
+          <p:nvPr/>
+        </p:nvCxnSpPr>
+        <p:spPr>
+          <a:xfrm flipV="1">
+            <a:off x="3076451" y="2291121"/>
+            <a:ext cx="232134" cy="243680"/>
+          </a:xfrm>
+          <a:prstGeom prst="straightConnector1">
+            <a:avLst/>
+          </a:prstGeom>
+          <a:ln>
+            <a:tailEnd type="triangle"/>
+          </a:ln>
+        </p:spPr>
+        <p:style>
+          <a:lnRef idx="1">
+            <a:schemeClr val="accent1"/>
+          </a:lnRef>
+          <a:fillRef idx="0">
+            <a:schemeClr val="accent1"/>
+          </a:fillRef>
+          <a:effectRef idx="0">
+            <a:schemeClr val="accent1"/>
+          </a:effectRef>
+          <a:fontRef idx="minor">
+            <a:schemeClr val="tx1"/>
+          </a:fontRef>
+        </p:style>
+      </p:cxnSp>
+      <p:cxnSp>
+        <p:nvCxnSpPr>
+          <p:cNvPr id="75" name="Straight Arrow Connector 74"/>
+          <p:cNvCxnSpPr>
+            <a:endCxn id="48" idx="1"/>
+          </p:cNvCxnSpPr>
+          <p:nvPr/>
+        </p:nvCxnSpPr>
+        <p:spPr>
+          <a:xfrm>
+            <a:off x="3035610" y="4280006"/>
+            <a:ext cx="272975" cy="100357"/>
+          </a:xfrm>
+          <a:prstGeom prst="straightConnector1">
+            <a:avLst/>
+          </a:prstGeom>
+          <a:ln>
+            <a:tailEnd type="triangle"/>
+          </a:ln>
+        </p:spPr>
+        <p:style>
+          <a:lnRef idx="1">
+            <a:schemeClr val="accent1"/>
+          </a:lnRef>
+          <a:fillRef idx="0">
+            <a:schemeClr val="accent1"/>
+          </a:fillRef>
+          <a:effectRef idx="0">
+            <a:schemeClr val="accent1"/>
+          </a:effectRef>
+          <a:fontRef idx="minor">
+            <a:schemeClr val="tx1"/>
+          </a:fontRef>
+        </p:style>
+      </p:cxnSp>
     </p:spTree>
     <p:extLst>
       <p:ext uri="{BB962C8B-B14F-4D97-AF65-F5344CB8AC3E}">
@@ -4335,7 +4327,7 @@
     </a:clrScheme>
     <a:fontScheme name="Office">
       <a:majorFont>
-        <a:latin typeface="Calibri Light" panose="020F0302020204030204"/>
+        <a:latin typeface="Calibri Light"/>
         <a:ea typeface=""/>
         <a:cs typeface=""/>
         <a:font script="Jpan" typeface="ＭＳ Ｐゴシック"/>
@@ -4370,7 +4362,7 @@
         <a:font script="Geor" typeface="Sylfaen"/>
       </a:majorFont>
       <a:minorFont>
-        <a:latin typeface="Calibri" panose="020F0502020204030204"/>
+        <a:latin typeface="Calibri"/>
         <a:ea typeface=""/>
         <a:cs typeface=""/>
         <a:font script="Jpan" typeface="ＭＳ Ｐゴシック"/>
@@ -4547,7 +4539,7 @@
   <a:extraClrSchemeLst/>
   <a:extLst>
     <a:ext uri="{05A4C25C-085E-4340-85A3-A5531E510DB2}">
-      <thm15:themeFamily xmlns:thm15="http://schemas.microsoft.com/office/thememl/2012/main" name="Office Theme" id="{62F939B6-93AF-4DB8-9C6B-D6C7DFDC589F}" vid="{4A3C46E8-61CC-4603-A589-7422A47A8E4A}"/>
+      <thm15:themeFamily xmlns:thm15="http://schemas.microsoft.com/office/thememl/2012/main" xmlns="" name="Office Theme" id="{62F939B6-93AF-4DB8-9C6B-D6C7DFDC589F}" vid="{4A3C46E8-61CC-4603-A589-7422A47A8E4A}"/>
     </a:ext>
   </a:extLst>
 </a:theme>

</xml_diff>